<commit_message>
Finished initial draft of presentation
</commit_message>
<xml_diff>
--- a/ColumbusCodeCamp2012/Slides/BDDWebApp.pptx
+++ b/ColumbusCodeCamp2012/Slides/BDDWebApp.pptx
@@ -8,11 +8,11 @@
     <p:sldId id="256" r:id="rId2"/>
     <p:sldId id="257" r:id="rId3"/>
     <p:sldId id="260" r:id="rId4"/>
-    <p:sldId id="262" r:id="rId5"/>
-    <p:sldId id="263" r:id="rId6"/>
-    <p:sldId id="264" r:id="rId7"/>
-    <p:sldId id="265" r:id="rId8"/>
-    <p:sldId id="266" r:id="rId9"/>
+    <p:sldId id="263" r:id="rId5"/>
+    <p:sldId id="264" r:id="rId6"/>
+    <p:sldId id="265" r:id="rId7"/>
+    <p:sldId id="266" r:id="rId8"/>
+    <p:sldId id="269" r:id="rId9"/>
     <p:sldId id="261" r:id="rId10"/>
     <p:sldId id="267" r:id="rId11"/>
     <p:sldId id="259" r:id="rId12"/>
@@ -3132,14 +3132,7 @@
           <a:p>
             <a:r>
               <a:rPr lang="en-US" dirty="0" smtClean="0"/>
-              <a:t>Behavior-Driven Development for </a:t>
-            </a:r>
-            <a:br>
-              <a:rPr lang="en-US" dirty="0" smtClean="0"/>
-            </a:br>
-            <a:r>
-              <a:rPr lang="en-US" dirty="0" smtClean="0"/>
-              <a:t>Windows Phone Developers</a:t>
+              <a:t>Using BDD to Build .NET Web Applications</a:t>
             </a:r>
             <a:endParaRPr lang="en-US" dirty="0"/>
           </a:p>
@@ -3491,13 +3484,12 @@
           </a:bodyPr>
           <a:lstStyle/>
           <a:p>
-            <a:r>
-              <a:rPr lang="en-US" sz="2000" dirty="0" err="1" smtClean="0"/>
-              <a:t>SpecFlow</a:t>
-            </a:r>
+            <a:pPr marL="0" indent="0" algn="ctr">
+              <a:buNone/>
+            </a:pPr>
             <a:r>
               <a:rPr lang="en-US" sz="2000" dirty="0" smtClean="0"/>
-              <a:t>: </a:t>
+              <a:t>SpecFlow: </a:t>
             </a:r>
             <a:r>
               <a:rPr lang="en-US" sz="2000" dirty="0" smtClean="0">
@@ -3508,83 +3500,92 @@
             <a:endParaRPr lang="en-US" sz="2000" dirty="0" smtClean="0"/>
           </a:p>
           <a:p>
+            <a:pPr marL="0" indent="0" algn="ctr">
+              <a:buNone/>
+            </a:pPr>
             <a:r>
               <a:rPr lang="en-US" sz="2000" dirty="0" err="1" smtClean="0"/>
-              <a:t>SpecFlow</a:t>
-            </a:r>
-            <a:r>
-              <a:rPr lang="en-US" sz="2000" dirty="0"/>
-              <a:t> for WP7: </a:t>
-            </a:r>
-            <a:r>
-              <a:rPr lang="en-US" sz="2000" dirty="0">
-                <a:hlinkClick r:id="rId3"/>
-              </a:rPr>
-              <a:t>https://github.com/techtalk/SpecFlow/wiki/Windows-Phone-7-</a:t>
+              <a:t>WatiN</a:t>
+            </a:r>
+            <a:r>
+              <a:rPr lang="en-US" sz="2000" dirty="0" smtClean="0"/>
+              <a:t>: </a:t>
             </a:r>
             <a:r>
               <a:rPr lang="en-US" sz="2000" dirty="0" smtClean="0">
                 <a:hlinkClick r:id="rId3"/>
               </a:rPr>
-              <a:t>Support</a:t>
-            </a:r>
-            <a:endParaRPr lang="en-US" sz="2000" dirty="0" smtClean="0"/>
-          </a:p>
-          <a:p>
+              <a:t>www.watin.org</a:t>
+            </a:r>
+            <a:endParaRPr lang="en-US" sz="2000" dirty="0"/>
+          </a:p>
+          <a:p>
+            <a:pPr marL="0" indent="0" algn="ctr">
+              <a:buNone/>
+            </a:pPr>
+            <a:r>
+              <a:rPr lang="en-US" sz="2000" dirty="0" err="1" smtClean="0"/>
+              <a:t>Reshar</a:t>
+            </a:r>
+            <a:r>
+              <a:rPr lang="en-US" sz="2000" dirty="0" err="1" smtClean="0"/>
+              <a:t>per</a:t>
+            </a:r>
             <a:r>
               <a:rPr lang="en-US" sz="2000" dirty="0" smtClean="0"/>
-              <a:t>Silverlight Unit Test </a:t>
-            </a:r>
-            <a:r>
-              <a:rPr lang="en-US" sz="2000" dirty="0"/>
-              <a:t>Framework Binaries: </a:t>
-            </a:r>
-            <a:r>
-              <a:rPr lang="en-US" sz="2000" dirty="0">
-                <a:hlinkClick r:id="rId4"/>
-              </a:rPr>
-              <a:t>http://www.jeff.wilcox.name/2011/06/updated-ut-mango-bits</a:t>
+              <a:t>: </a:t>
             </a:r>
             <a:r>
               <a:rPr lang="en-US" sz="2000" dirty="0" smtClean="0">
                 <a:hlinkClick r:id="rId4"/>
               </a:rPr>
-              <a:t>/</a:t>
+              <a:t>www.jetbrains.com/resharper</a:t>
             </a:r>
             <a:endParaRPr lang="en-US" sz="2000" dirty="0" smtClean="0"/>
           </a:p>
           <a:p>
+            <a:pPr marL="0" indent="0" algn="ctr">
+              <a:buNone/>
+            </a:pPr>
             <a:r>
               <a:rPr lang="en-US" sz="2000" dirty="0" err="1" smtClean="0"/>
-              <a:t>Evercraft</a:t>
+              <a:t>GitHub</a:t>
             </a:r>
             <a:r>
               <a:rPr lang="en-US" sz="2000" dirty="0" smtClean="0"/>
-              <a:t> Kata By: Guy Royse (@</a:t>
-            </a:r>
-            <a:r>
-              <a:rPr lang="en-US" sz="2000" dirty="0" err="1" smtClean="0"/>
-              <a:t>guyroyse</a:t>
-            </a:r>
-            <a:r>
-              <a:rPr lang="en-US" sz="2000" dirty="0" smtClean="0"/>
-              <a:t>) &amp; George Walters II (</a:t>
-            </a:r>
-            <a:r>
-              <a:rPr lang="en-US" sz="2000" dirty="0"/>
-              <a:t>@walterg2) : </a:t>
-            </a:r>
-            <a:r>
-              <a:rPr lang="en-US" sz="2000" dirty="0">
-                <a:hlinkClick r:id="rId5"/>
-              </a:rPr>
-              <a:t>https://github.com/walterg2/EverCraft-</a:t>
+              <a:t>: </a:t>
             </a:r>
             <a:r>
               <a:rPr lang="en-US" sz="2000" dirty="0" smtClean="0">
                 <a:hlinkClick r:id="rId5"/>
               </a:rPr>
-              <a:t>Kata</a:t>
+              <a:t>www.github.com/jerrelblankenship</a:t>
+            </a:r>
+            <a:endParaRPr lang="en-US" sz="2000" dirty="0" smtClean="0"/>
+          </a:p>
+          <a:p>
+            <a:pPr marL="0" indent="0" algn="ctr">
+              <a:buNone/>
+            </a:pPr>
+            <a:r>
+              <a:rPr lang="en-US" sz="2000" dirty="0" err="1" smtClean="0"/>
+              <a:t>SpeakerRate</a:t>
+            </a:r>
+            <a:r>
+              <a:rPr lang="en-US" sz="2000" dirty="0"/>
+              <a:t>: </a:t>
+            </a:r>
+            <a:r>
+              <a:rPr lang="en-US" sz="2000" dirty="0">
+                <a:hlinkClick r:id="rId6"/>
+              </a:rPr>
+              <a:t>http://</a:t>
+            </a:r>
+            <a:r>
+              <a:rPr lang="en-US" sz="2000" dirty="0" smtClean="0">
+                <a:hlinkClick r:id="rId6"/>
+              </a:rPr>
+              <a:t>spkr8.com/s/17810</a:t>
             </a:r>
             <a:endParaRPr lang="en-US" sz="2000" dirty="0" smtClean="0"/>
           </a:p>
@@ -3670,8 +3671,13 @@
           <a:p>
             <a:r>
               <a:rPr lang="en-US" dirty="0" smtClean="0"/>
-              <a:t>Senior Programmer Analyst at Heuristic Solutions LLC</a:t>
-            </a:r>
+              <a:t>Software Engineer at </a:t>
+            </a:r>
+            <a:r>
+              <a:rPr lang="en-US" dirty="0" err="1" smtClean="0"/>
+              <a:t>RelayHealth</a:t>
+            </a:r>
+            <a:endParaRPr lang="en-US" dirty="0" smtClean="0"/>
           </a:p>
           <a:p>
             <a:r>
@@ -4335,614 +4341,6 @@
         </p:nvSpPr>
         <p:spPr/>
         <p:txBody>
-          <a:bodyPr>
-            <a:normAutofit/>
-          </a:bodyPr>
-          <a:lstStyle/>
-          <a:p>
-            <a:r>
-              <a:rPr lang="en-US" dirty="0" smtClean="0"/>
-              <a:t>BDD vs. TDD</a:t>
-            </a:r>
-            <a:endParaRPr lang="en-US" dirty="0"/>
-          </a:p>
-        </p:txBody>
-      </p:sp>
-      <p:sp>
-        <p:nvSpPr>
-          <p:cNvPr id="3" name="Content Placeholder 2"/>
-          <p:cNvSpPr>
-            <a:spLocks noGrp="1"/>
-          </p:cNvSpPr>
-          <p:nvPr>
-            <p:ph idx="1"/>
-          </p:nvPr>
-        </p:nvSpPr>
-        <p:spPr/>
-        <p:txBody>
-          <a:bodyPr/>
-          <a:lstStyle/>
-          <a:p>
-            <a:r>
-              <a:rPr lang="en-US" dirty="0" smtClean="0"/>
-              <a:t>TDD</a:t>
-            </a:r>
-          </a:p>
-          <a:p>
-            <a:pPr lvl="1"/>
-            <a:r>
-              <a:rPr lang="en-US" dirty="0" smtClean="0"/>
-              <a:t>Centered on the inner workings of a system</a:t>
-            </a:r>
-          </a:p>
-          <a:p>
-            <a:pPr lvl="1"/>
-            <a:r>
-              <a:rPr lang="en-US" dirty="0" smtClean="0"/>
-              <a:t>Geared towards developers</a:t>
-            </a:r>
-          </a:p>
-          <a:p>
-            <a:r>
-              <a:rPr lang="en-US" dirty="0" smtClean="0"/>
-              <a:t>BDD</a:t>
-            </a:r>
-          </a:p>
-          <a:p>
-            <a:pPr lvl="1"/>
-            <a:r>
-              <a:rPr lang="en-US" dirty="0" smtClean="0"/>
-              <a:t>Centered on behavior of a system</a:t>
-            </a:r>
-          </a:p>
-          <a:p>
-            <a:pPr lvl="1"/>
-            <a:r>
-              <a:rPr lang="en-US" dirty="0" smtClean="0"/>
-              <a:t>Geared towards </a:t>
-            </a:r>
-            <a:r>
-              <a:rPr lang="en-US" dirty="0" err="1" smtClean="0"/>
-              <a:t>steakholders</a:t>
-            </a:r>
-            <a:endParaRPr lang="en-US" dirty="0" smtClean="0"/>
-          </a:p>
-        </p:txBody>
-      </p:sp>
-    </p:spTree>
-    <p:extLst>
-      <p:ext uri="{BB962C8B-B14F-4D97-AF65-F5344CB8AC3E}">
-        <p14:creationId xmlns:p14="http://schemas.microsoft.com/office/powerpoint/2010/main" val="283954418"/>
-      </p:ext>
-    </p:extLst>
-  </p:cSld>
-  <p:clrMapOvr>
-    <a:masterClrMapping/>
-  </p:clrMapOvr>
-  <p:transition spd="slow">
-    <p:push dir="u"/>
-  </p:transition>
-  <p:timing>
-    <p:tnLst>
-      <p:par>
-        <p:cTn id="1" dur="indefinite" restart="never" nodeType="tmRoot">
-          <p:childTnLst>
-            <p:seq concurrent="1" nextAc="seek">
-              <p:cTn id="2" dur="indefinite" nodeType="mainSeq">
-                <p:childTnLst>
-                  <p:par>
-                    <p:cTn id="3" fill="hold">
-                      <p:stCondLst>
-                        <p:cond delay="indefinite"/>
-                      </p:stCondLst>
-                      <p:childTnLst>
-                        <p:par>
-                          <p:cTn id="4" fill="hold">
-                            <p:stCondLst>
-                              <p:cond delay="0"/>
-                            </p:stCondLst>
-                            <p:childTnLst>
-                              <p:par>
-                                <p:cTn id="5" presetID="12" presetClass="entr" presetSubtype="4" fill="hold" grpId="0" nodeType="clickEffect">
-                                  <p:stCondLst>
-                                    <p:cond delay="0"/>
-                                  </p:stCondLst>
-                                  <p:childTnLst>
-                                    <p:set>
-                                      <p:cBhvr>
-                                        <p:cTn id="6" dur="1" fill="hold">
-                                          <p:stCondLst>
-                                            <p:cond delay="0"/>
-                                          </p:stCondLst>
-                                        </p:cTn>
-                                        <p:tgtEl>
-                                          <p:spTgt spid="3">
-                                            <p:txEl>
-                                              <p:pRg st="0" end="0"/>
-                                            </p:txEl>
-                                          </p:spTgt>
-                                        </p:tgtEl>
-                                        <p:attrNameLst>
-                                          <p:attrName>style.visibility</p:attrName>
-                                        </p:attrNameLst>
-                                      </p:cBhvr>
-                                      <p:to>
-                                        <p:strVal val="visible"/>
-                                      </p:to>
-                                    </p:set>
-                                    <p:anim calcmode="lin" valueType="num">
-                                      <p:cBhvr additive="base">
-                                        <p:cTn id="7" dur="500"/>
-                                        <p:tgtEl>
-                                          <p:spTgt spid="3">
-                                            <p:txEl>
-                                              <p:pRg st="0" end="0"/>
-                                            </p:txEl>
-                                          </p:spTgt>
-                                        </p:tgtEl>
-                                        <p:attrNameLst>
-                                          <p:attrName>ppt_y</p:attrName>
-                                        </p:attrNameLst>
-                                      </p:cBhvr>
-                                      <p:tavLst>
-                                        <p:tav tm="0">
-                                          <p:val>
-                                            <p:strVal val="#ppt_y+#ppt_h*1.125000"/>
-                                          </p:val>
-                                        </p:tav>
-                                        <p:tav tm="100000">
-                                          <p:val>
-                                            <p:strVal val="#ppt_y"/>
-                                          </p:val>
-                                        </p:tav>
-                                      </p:tavLst>
-                                    </p:anim>
-                                    <p:animEffect transition="in" filter="wipe(up)">
-                                      <p:cBhvr>
-                                        <p:cTn id="8" dur="500"/>
-                                        <p:tgtEl>
-                                          <p:spTgt spid="3">
-                                            <p:txEl>
-                                              <p:pRg st="0" end="0"/>
-                                            </p:txEl>
-                                          </p:spTgt>
-                                        </p:tgtEl>
-                                      </p:cBhvr>
-                                    </p:animEffect>
-                                  </p:childTnLst>
-                                </p:cTn>
-                              </p:par>
-                              <p:par>
-                                <p:cTn id="9" presetID="12" presetClass="entr" presetSubtype="4" fill="hold" grpId="0" nodeType="withEffect">
-                                  <p:stCondLst>
-                                    <p:cond delay="0"/>
-                                  </p:stCondLst>
-                                  <p:childTnLst>
-                                    <p:set>
-                                      <p:cBhvr>
-                                        <p:cTn id="10" dur="1" fill="hold">
-                                          <p:stCondLst>
-                                            <p:cond delay="0"/>
-                                          </p:stCondLst>
-                                        </p:cTn>
-                                        <p:tgtEl>
-                                          <p:spTgt spid="3">
-                                            <p:txEl>
-                                              <p:pRg st="1" end="1"/>
-                                            </p:txEl>
-                                          </p:spTgt>
-                                        </p:tgtEl>
-                                        <p:attrNameLst>
-                                          <p:attrName>style.visibility</p:attrName>
-                                        </p:attrNameLst>
-                                      </p:cBhvr>
-                                      <p:to>
-                                        <p:strVal val="visible"/>
-                                      </p:to>
-                                    </p:set>
-                                    <p:anim calcmode="lin" valueType="num">
-                                      <p:cBhvr additive="base">
-                                        <p:cTn id="11" dur="500"/>
-                                        <p:tgtEl>
-                                          <p:spTgt spid="3">
-                                            <p:txEl>
-                                              <p:pRg st="1" end="1"/>
-                                            </p:txEl>
-                                          </p:spTgt>
-                                        </p:tgtEl>
-                                        <p:attrNameLst>
-                                          <p:attrName>ppt_y</p:attrName>
-                                        </p:attrNameLst>
-                                      </p:cBhvr>
-                                      <p:tavLst>
-                                        <p:tav tm="0">
-                                          <p:val>
-                                            <p:strVal val="#ppt_y+#ppt_h*1.125000"/>
-                                          </p:val>
-                                        </p:tav>
-                                        <p:tav tm="100000">
-                                          <p:val>
-                                            <p:strVal val="#ppt_y"/>
-                                          </p:val>
-                                        </p:tav>
-                                      </p:tavLst>
-                                    </p:anim>
-                                    <p:animEffect transition="in" filter="wipe(up)">
-                                      <p:cBhvr>
-                                        <p:cTn id="12" dur="500"/>
-                                        <p:tgtEl>
-                                          <p:spTgt spid="3">
-                                            <p:txEl>
-                                              <p:pRg st="1" end="1"/>
-                                            </p:txEl>
-                                          </p:spTgt>
-                                        </p:tgtEl>
-                                      </p:cBhvr>
-                                    </p:animEffect>
-                                  </p:childTnLst>
-                                </p:cTn>
-                              </p:par>
-                              <p:par>
-                                <p:cTn id="13" presetID="12" presetClass="entr" presetSubtype="4" fill="hold" grpId="0" nodeType="withEffect">
-                                  <p:stCondLst>
-                                    <p:cond delay="0"/>
-                                  </p:stCondLst>
-                                  <p:childTnLst>
-                                    <p:set>
-                                      <p:cBhvr>
-                                        <p:cTn id="14" dur="1" fill="hold">
-                                          <p:stCondLst>
-                                            <p:cond delay="0"/>
-                                          </p:stCondLst>
-                                        </p:cTn>
-                                        <p:tgtEl>
-                                          <p:spTgt spid="3">
-                                            <p:txEl>
-                                              <p:pRg st="2" end="2"/>
-                                            </p:txEl>
-                                          </p:spTgt>
-                                        </p:tgtEl>
-                                        <p:attrNameLst>
-                                          <p:attrName>style.visibility</p:attrName>
-                                        </p:attrNameLst>
-                                      </p:cBhvr>
-                                      <p:to>
-                                        <p:strVal val="visible"/>
-                                      </p:to>
-                                    </p:set>
-                                    <p:anim calcmode="lin" valueType="num">
-                                      <p:cBhvr additive="base">
-                                        <p:cTn id="15" dur="500"/>
-                                        <p:tgtEl>
-                                          <p:spTgt spid="3">
-                                            <p:txEl>
-                                              <p:pRg st="2" end="2"/>
-                                            </p:txEl>
-                                          </p:spTgt>
-                                        </p:tgtEl>
-                                        <p:attrNameLst>
-                                          <p:attrName>ppt_y</p:attrName>
-                                        </p:attrNameLst>
-                                      </p:cBhvr>
-                                      <p:tavLst>
-                                        <p:tav tm="0">
-                                          <p:val>
-                                            <p:strVal val="#ppt_y+#ppt_h*1.125000"/>
-                                          </p:val>
-                                        </p:tav>
-                                        <p:tav tm="100000">
-                                          <p:val>
-                                            <p:strVal val="#ppt_y"/>
-                                          </p:val>
-                                        </p:tav>
-                                      </p:tavLst>
-                                    </p:anim>
-                                    <p:animEffect transition="in" filter="wipe(up)">
-                                      <p:cBhvr>
-                                        <p:cTn id="16" dur="500"/>
-                                        <p:tgtEl>
-                                          <p:spTgt spid="3">
-                                            <p:txEl>
-                                              <p:pRg st="2" end="2"/>
-                                            </p:txEl>
-                                          </p:spTgt>
-                                        </p:tgtEl>
-                                      </p:cBhvr>
-                                    </p:animEffect>
-                                  </p:childTnLst>
-                                </p:cTn>
-                              </p:par>
-                            </p:childTnLst>
-                          </p:cTn>
-                        </p:par>
-                      </p:childTnLst>
-                    </p:cTn>
-                  </p:par>
-                  <p:par>
-                    <p:cTn id="17" fill="hold">
-                      <p:stCondLst>
-                        <p:cond delay="indefinite"/>
-                      </p:stCondLst>
-                      <p:childTnLst>
-                        <p:par>
-                          <p:cTn id="18" fill="hold">
-                            <p:stCondLst>
-                              <p:cond delay="0"/>
-                            </p:stCondLst>
-                            <p:childTnLst>
-                              <p:par>
-                                <p:cTn id="19" presetID="12" presetClass="entr" presetSubtype="4" fill="hold" grpId="0" nodeType="clickEffect">
-                                  <p:stCondLst>
-                                    <p:cond delay="0"/>
-                                  </p:stCondLst>
-                                  <p:childTnLst>
-                                    <p:set>
-                                      <p:cBhvr>
-                                        <p:cTn id="20" dur="1" fill="hold">
-                                          <p:stCondLst>
-                                            <p:cond delay="0"/>
-                                          </p:stCondLst>
-                                        </p:cTn>
-                                        <p:tgtEl>
-                                          <p:spTgt spid="3">
-                                            <p:txEl>
-                                              <p:pRg st="3" end="3"/>
-                                            </p:txEl>
-                                          </p:spTgt>
-                                        </p:tgtEl>
-                                        <p:attrNameLst>
-                                          <p:attrName>style.visibility</p:attrName>
-                                        </p:attrNameLst>
-                                      </p:cBhvr>
-                                      <p:to>
-                                        <p:strVal val="visible"/>
-                                      </p:to>
-                                    </p:set>
-                                    <p:anim calcmode="lin" valueType="num">
-                                      <p:cBhvr additive="base">
-                                        <p:cTn id="21" dur="500"/>
-                                        <p:tgtEl>
-                                          <p:spTgt spid="3">
-                                            <p:txEl>
-                                              <p:pRg st="3" end="3"/>
-                                            </p:txEl>
-                                          </p:spTgt>
-                                        </p:tgtEl>
-                                        <p:attrNameLst>
-                                          <p:attrName>ppt_y</p:attrName>
-                                        </p:attrNameLst>
-                                      </p:cBhvr>
-                                      <p:tavLst>
-                                        <p:tav tm="0">
-                                          <p:val>
-                                            <p:strVal val="#ppt_y+#ppt_h*1.125000"/>
-                                          </p:val>
-                                        </p:tav>
-                                        <p:tav tm="100000">
-                                          <p:val>
-                                            <p:strVal val="#ppt_y"/>
-                                          </p:val>
-                                        </p:tav>
-                                      </p:tavLst>
-                                    </p:anim>
-                                    <p:animEffect transition="in" filter="wipe(up)">
-                                      <p:cBhvr>
-                                        <p:cTn id="22" dur="500"/>
-                                        <p:tgtEl>
-                                          <p:spTgt spid="3">
-                                            <p:txEl>
-                                              <p:pRg st="3" end="3"/>
-                                            </p:txEl>
-                                          </p:spTgt>
-                                        </p:tgtEl>
-                                      </p:cBhvr>
-                                    </p:animEffect>
-                                  </p:childTnLst>
-                                </p:cTn>
-                              </p:par>
-                              <p:par>
-                                <p:cTn id="23" presetID="12" presetClass="entr" presetSubtype="4" fill="hold" grpId="0" nodeType="withEffect">
-                                  <p:stCondLst>
-                                    <p:cond delay="0"/>
-                                  </p:stCondLst>
-                                  <p:childTnLst>
-                                    <p:set>
-                                      <p:cBhvr>
-                                        <p:cTn id="24" dur="1" fill="hold">
-                                          <p:stCondLst>
-                                            <p:cond delay="0"/>
-                                          </p:stCondLst>
-                                        </p:cTn>
-                                        <p:tgtEl>
-                                          <p:spTgt spid="3">
-                                            <p:txEl>
-                                              <p:pRg st="4" end="4"/>
-                                            </p:txEl>
-                                          </p:spTgt>
-                                        </p:tgtEl>
-                                        <p:attrNameLst>
-                                          <p:attrName>style.visibility</p:attrName>
-                                        </p:attrNameLst>
-                                      </p:cBhvr>
-                                      <p:to>
-                                        <p:strVal val="visible"/>
-                                      </p:to>
-                                    </p:set>
-                                    <p:anim calcmode="lin" valueType="num">
-                                      <p:cBhvr additive="base">
-                                        <p:cTn id="25" dur="500"/>
-                                        <p:tgtEl>
-                                          <p:spTgt spid="3">
-                                            <p:txEl>
-                                              <p:pRg st="4" end="4"/>
-                                            </p:txEl>
-                                          </p:spTgt>
-                                        </p:tgtEl>
-                                        <p:attrNameLst>
-                                          <p:attrName>ppt_y</p:attrName>
-                                        </p:attrNameLst>
-                                      </p:cBhvr>
-                                      <p:tavLst>
-                                        <p:tav tm="0">
-                                          <p:val>
-                                            <p:strVal val="#ppt_y+#ppt_h*1.125000"/>
-                                          </p:val>
-                                        </p:tav>
-                                        <p:tav tm="100000">
-                                          <p:val>
-                                            <p:strVal val="#ppt_y"/>
-                                          </p:val>
-                                        </p:tav>
-                                      </p:tavLst>
-                                    </p:anim>
-                                    <p:animEffect transition="in" filter="wipe(up)">
-                                      <p:cBhvr>
-                                        <p:cTn id="26" dur="500"/>
-                                        <p:tgtEl>
-                                          <p:spTgt spid="3">
-                                            <p:txEl>
-                                              <p:pRg st="4" end="4"/>
-                                            </p:txEl>
-                                          </p:spTgt>
-                                        </p:tgtEl>
-                                      </p:cBhvr>
-                                    </p:animEffect>
-                                  </p:childTnLst>
-                                </p:cTn>
-                              </p:par>
-                              <p:par>
-                                <p:cTn id="27" presetID="12" presetClass="entr" presetSubtype="4" fill="hold" grpId="0" nodeType="withEffect">
-                                  <p:stCondLst>
-                                    <p:cond delay="0"/>
-                                  </p:stCondLst>
-                                  <p:childTnLst>
-                                    <p:set>
-                                      <p:cBhvr>
-                                        <p:cTn id="28" dur="1" fill="hold">
-                                          <p:stCondLst>
-                                            <p:cond delay="0"/>
-                                          </p:stCondLst>
-                                        </p:cTn>
-                                        <p:tgtEl>
-                                          <p:spTgt spid="3">
-                                            <p:txEl>
-                                              <p:pRg st="5" end="5"/>
-                                            </p:txEl>
-                                          </p:spTgt>
-                                        </p:tgtEl>
-                                        <p:attrNameLst>
-                                          <p:attrName>style.visibility</p:attrName>
-                                        </p:attrNameLst>
-                                      </p:cBhvr>
-                                      <p:to>
-                                        <p:strVal val="visible"/>
-                                      </p:to>
-                                    </p:set>
-                                    <p:anim calcmode="lin" valueType="num">
-                                      <p:cBhvr additive="base">
-                                        <p:cTn id="29" dur="500"/>
-                                        <p:tgtEl>
-                                          <p:spTgt spid="3">
-                                            <p:txEl>
-                                              <p:pRg st="5" end="5"/>
-                                            </p:txEl>
-                                          </p:spTgt>
-                                        </p:tgtEl>
-                                        <p:attrNameLst>
-                                          <p:attrName>ppt_y</p:attrName>
-                                        </p:attrNameLst>
-                                      </p:cBhvr>
-                                      <p:tavLst>
-                                        <p:tav tm="0">
-                                          <p:val>
-                                            <p:strVal val="#ppt_y+#ppt_h*1.125000"/>
-                                          </p:val>
-                                        </p:tav>
-                                        <p:tav tm="100000">
-                                          <p:val>
-                                            <p:strVal val="#ppt_y"/>
-                                          </p:val>
-                                        </p:tav>
-                                      </p:tavLst>
-                                    </p:anim>
-                                    <p:animEffect transition="in" filter="wipe(up)">
-                                      <p:cBhvr>
-                                        <p:cTn id="30" dur="500"/>
-                                        <p:tgtEl>
-                                          <p:spTgt spid="3">
-                                            <p:txEl>
-                                              <p:pRg st="5" end="5"/>
-                                            </p:txEl>
-                                          </p:spTgt>
-                                        </p:tgtEl>
-                                      </p:cBhvr>
-                                    </p:animEffect>
-                                  </p:childTnLst>
-                                </p:cTn>
-                              </p:par>
-                            </p:childTnLst>
-                          </p:cTn>
-                        </p:par>
-                      </p:childTnLst>
-                    </p:cTn>
-                  </p:par>
-                </p:childTnLst>
-              </p:cTn>
-              <p:prevCondLst>
-                <p:cond evt="onPrev" delay="0">
-                  <p:tgtEl>
-                    <p:sldTgt/>
-                  </p:tgtEl>
-                </p:cond>
-              </p:prevCondLst>
-              <p:nextCondLst>
-                <p:cond evt="onNext" delay="0">
-                  <p:tgtEl>
-                    <p:sldTgt/>
-                  </p:tgtEl>
-                </p:cond>
-              </p:nextCondLst>
-            </p:seq>
-          </p:childTnLst>
-        </p:cTn>
-      </p:par>
-    </p:tnLst>
-    <p:bldLst>
-      <p:bldP spid="3" grpId="0" build="p"/>
-    </p:bldLst>
-  </p:timing>
-</p:sld>
-</file>
-
-<file path=ppt/slides/slide5.xml><?xml version="1.0" encoding="utf-8"?>
-<p:sld xmlns:a="http://schemas.openxmlformats.org/drawingml/2006/main" xmlns:r="http://schemas.openxmlformats.org/officeDocument/2006/relationships" xmlns:p="http://schemas.openxmlformats.org/presentationml/2006/main">
-  <p:cSld>
-    <p:spTree>
-      <p:nvGrpSpPr>
-        <p:cNvPr id="1" name=""/>
-        <p:cNvGrpSpPr/>
-        <p:nvPr/>
-      </p:nvGrpSpPr>
-      <p:grpSpPr>
-        <a:xfrm>
-          <a:off x="0" y="0"/>
-          <a:ext cx="0" cy="0"/>
-          <a:chOff x="0" y="0"/>
-          <a:chExt cx="0" cy="0"/>
-        </a:xfrm>
-      </p:grpSpPr>
-      <p:sp>
-        <p:nvSpPr>
-          <p:cNvPr id="2" name="Title 1"/>
-          <p:cNvSpPr>
-            <a:spLocks noGrp="1"/>
-          </p:cNvSpPr>
-          <p:nvPr>
-            <p:ph type="title"/>
-          </p:nvPr>
-        </p:nvSpPr>
-        <p:spPr/>
-        <p:txBody>
           <a:bodyPr/>
           <a:lstStyle/>
           <a:p>
@@ -4983,7 +4381,15 @@
           <a:p>
             <a:r>
               <a:rPr lang="en-US" dirty="0" smtClean="0"/>
-              <a:t>Goal: produce software for the steak holder that they want and need.</a:t>
+              <a:t>Goal: produce software for the </a:t>
+            </a:r>
+            <a:r>
+              <a:rPr lang="en-US" dirty="0" smtClean="0"/>
+              <a:t>stake </a:t>
+            </a:r>
+            <a:r>
+              <a:rPr lang="en-US" dirty="0" smtClean="0"/>
+              <a:t>holder that they want and need.</a:t>
             </a:r>
           </a:p>
         </p:txBody>
@@ -5301,7 +4707,7 @@
 </p:sld>
 </file>
 
-<file path=ppt/slides/slide6.xml><?xml version="1.0" encoding="utf-8"?>
+<file path=ppt/slides/slide5.xml><?xml version="1.0" encoding="utf-8"?>
 <p:sld xmlns:a="http://schemas.openxmlformats.org/drawingml/2006/main" xmlns:r="http://schemas.openxmlformats.org/officeDocument/2006/relationships" xmlns:p="http://schemas.openxmlformats.org/presentationml/2006/main">
   <p:cSld>
     <p:spTree>
@@ -5366,7 +4772,7 @@
 </p:sld>
 </file>
 
-<file path=ppt/slides/slide7.xml><?xml version="1.0" encoding="utf-8"?>
+<file path=ppt/slides/slide6.xml><?xml version="1.0" encoding="utf-8"?>
 <p:sld xmlns:a="http://schemas.openxmlformats.org/drawingml/2006/main" xmlns:r="http://schemas.openxmlformats.org/officeDocument/2006/relationships" xmlns:p="http://schemas.openxmlformats.org/presentationml/2006/main">
   <p:cSld>
     <p:spTree>
@@ -5402,47 +4808,40 @@
           <a:p>
             <a:r>
               <a:rPr lang="en-US" dirty="0" smtClean="0"/>
-              <a:t>What is </a:t>
+              <a:t>What is SpecFlow?	</a:t>
+            </a:r>
+            <a:endParaRPr lang="en-US" dirty="0"/>
+          </a:p>
+        </p:txBody>
+      </p:sp>
+      <p:sp>
+        <p:nvSpPr>
+          <p:cNvPr id="6" name="Content Placeholder 5"/>
+          <p:cNvSpPr>
+            <a:spLocks noGrp="1"/>
+          </p:cNvSpPr>
+          <p:nvPr>
+            <p:ph idx="1"/>
+          </p:nvPr>
+        </p:nvSpPr>
+        <p:spPr/>
+        <p:txBody>
+          <a:bodyPr/>
+          <a:lstStyle/>
+          <a:p>
+            <a:r>
+              <a:rPr lang="en-US" dirty="0" smtClean="0"/>
+              <a:t>Open-source </a:t>
+            </a:r>
+            <a:r>
+              <a:rPr lang="en-US" dirty="0" smtClean="0"/>
+              <a:t>BDD framework developed for the .NET </a:t>
             </a:r>
             <a:r>
               <a:rPr lang="en-US" dirty="0" err="1" smtClean="0"/>
-              <a:t>SpecFlow</a:t>
-            </a:r>
-            <a:r>
-              <a:rPr lang="en-US" dirty="0" smtClean="0"/>
-              <a:t>?	</a:t>
-            </a:r>
-            <a:endParaRPr lang="en-US" dirty="0"/>
-          </a:p>
-        </p:txBody>
-      </p:sp>
-      <p:sp>
-        <p:nvSpPr>
-          <p:cNvPr id="6" name="Content Placeholder 5"/>
-          <p:cNvSpPr>
-            <a:spLocks noGrp="1"/>
-          </p:cNvSpPr>
-          <p:nvPr>
-            <p:ph idx="1"/>
-          </p:nvPr>
-        </p:nvSpPr>
-        <p:spPr/>
-        <p:txBody>
-          <a:bodyPr/>
-          <a:lstStyle/>
-          <a:p>
-            <a:r>
-              <a:rPr lang="en-US" dirty="0" smtClean="0"/>
-              <a:t>Open-source tool geared towards </a:t>
-            </a:r>
-            <a:r>
-              <a:rPr lang="en-US" dirty="0" err="1" smtClean="0"/>
-              <a:t>.Net</a:t>
-            </a:r>
-            <a:r>
-              <a:rPr lang="en-US" dirty="0" smtClean="0"/>
-              <a:t> development</a:t>
-            </a:r>
+              <a:t>Framwork</a:t>
+            </a:r>
+            <a:endParaRPr lang="en-US" dirty="0" smtClean="0"/>
           </a:p>
           <a:p>
             <a:r>
@@ -5450,18 +4849,22 @@
               <a:t>Takes defined features or </a:t>
             </a:r>
             <a:r>
-              <a:rPr lang="en-US" dirty="0" err="1" smtClean="0"/>
-              <a:t>bahaviors</a:t>
-            </a:r>
-            <a:r>
               <a:rPr lang="en-US" dirty="0" smtClean="0"/>
-              <a:t> and generates scenarios that can be tested.</a:t>
-            </a:r>
-          </a:p>
-          <a:p>
+              <a:t>behaviors </a:t>
+            </a:r>
             <a:r>
               <a:rPr lang="en-US" dirty="0" smtClean="0"/>
-              <a:t>Written in the Gherkin Language</a:t>
+              <a:t>and generates scenarios that can be tested.</a:t>
+            </a:r>
+          </a:p>
+          <a:p>
+            <a:r>
+              <a:rPr lang="en-US" dirty="0" smtClean="0"/>
+              <a:t>Written in the Gherkin </a:t>
+            </a:r>
+            <a:r>
+              <a:rPr lang="en-US" dirty="0" smtClean="0"/>
+              <a:t>Language</a:t>
             </a:r>
           </a:p>
         </p:txBody>
@@ -5779,7 +5182,7 @@
 </p:sld>
 </file>
 
-<file path=ppt/slides/slide8.xml><?xml version="1.0" encoding="utf-8"?>
+<file path=ppt/slides/slide7.xml><?xml version="1.0" encoding="utf-8"?>
 <p:sld xmlns:a="http://schemas.openxmlformats.org/drawingml/2006/main" xmlns:r="http://schemas.openxmlformats.org/officeDocument/2006/relationships" xmlns:p="http://schemas.openxmlformats.org/presentationml/2006/main">
   <p:cSld>
     <p:spTree>
@@ -6393,6 +5796,118 @@
 </p:sld>
 </file>
 
+<file path=ppt/slides/slide8.xml><?xml version="1.0" encoding="utf-8"?>
+<p:sld xmlns:a="http://schemas.openxmlformats.org/drawingml/2006/main" xmlns:r="http://schemas.openxmlformats.org/officeDocument/2006/relationships" xmlns:p="http://schemas.openxmlformats.org/presentationml/2006/main">
+  <p:cSld>
+    <p:spTree>
+      <p:nvGrpSpPr>
+        <p:cNvPr id="1" name=""/>
+        <p:cNvGrpSpPr/>
+        <p:nvPr/>
+      </p:nvGrpSpPr>
+      <p:grpSpPr>
+        <a:xfrm>
+          <a:off x="0" y="0"/>
+          <a:ext cx="0" cy="0"/>
+          <a:chOff x="0" y="0"/>
+          <a:chExt cx="0" cy="0"/>
+        </a:xfrm>
+      </p:grpSpPr>
+      <p:sp>
+        <p:nvSpPr>
+          <p:cNvPr id="2" name="Title 1"/>
+          <p:cNvSpPr>
+            <a:spLocks noGrp="1"/>
+          </p:cNvSpPr>
+          <p:nvPr>
+            <p:ph type="title"/>
+          </p:nvPr>
+        </p:nvSpPr>
+        <p:spPr/>
+        <p:txBody>
+          <a:bodyPr/>
+          <a:lstStyle/>
+          <a:p>
+            <a:r>
+              <a:rPr lang="en-US" dirty="0" smtClean="0"/>
+              <a:t>What is </a:t>
+            </a:r>
+            <a:r>
+              <a:rPr lang="en-US" dirty="0" err="1" smtClean="0"/>
+              <a:t>WatiN</a:t>
+            </a:r>
+            <a:endParaRPr lang="en-US" dirty="0"/>
+          </a:p>
+        </p:txBody>
+      </p:sp>
+      <p:sp>
+        <p:nvSpPr>
+          <p:cNvPr id="3" name="Content Placeholder 2"/>
+          <p:cNvSpPr>
+            <a:spLocks noGrp="1"/>
+          </p:cNvSpPr>
+          <p:nvPr>
+            <p:ph idx="1"/>
+          </p:nvPr>
+        </p:nvSpPr>
+        <p:spPr/>
+        <p:txBody>
+          <a:bodyPr/>
+          <a:lstStyle/>
+          <a:p>
+            <a:r>
+              <a:rPr lang="en-US" dirty="0" smtClean="0"/>
+              <a:t>Testing framework used for Web Application Testing.</a:t>
+            </a:r>
+          </a:p>
+          <a:p>
+            <a:r>
+              <a:rPr lang="en-US" dirty="0" smtClean="0"/>
+              <a:t>Inspired by </a:t>
+            </a:r>
+            <a:r>
+              <a:rPr lang="en-US" dirty="0" err="1" smtClean="0"/>
+              <a:t>Watir</a:t>
+            </a:r>
+            <a:r>
+              <a:rPr lang="en-US" dirty="0" smtClean="0"/>
+              <a:t>(Ruby)</a:t>
+            </a:r>
+          </a:p>
+          <a:p>
+            <a:pPr lvl="1"/>
+            <a:r>
+              <a:rPr lang="en-US" dirty="0" smtClean="0"/>
+              <a:t>Is .NET equivalent of </a:t>
+            </a:r>
+            <a:r>
+              <a:rPr lang="en-US" dirty="0" err="1" smtClean="0"/>
+              <a:t>Watir</a:t>
+            </a:r>
+            <a:endParaRPr lang="en-US" dirty="0" smtClean="0"/>
+          </a:p>
+          <a:p>
+            <a:r>
+              <a:rPr lang="en-US" dirty="0" smtClean="0"/>
+              <a:t>Allows a way to interact with the browser in your tests.</a:t>
+            </a:r>
+            <a:endParaRPr lang="en-US" dirty="0"/>
+          </a:p>
+        </p:txBody>
+      </p:sp>
+    </p:spTree>
+    <p:extLst>
+      <p:ext uri="{BB962C8B-B14F-4D97-AF65-F5344CB8AC3E}">
+        <p14:creationId xmlns:p14="http://schemas.microsoft.com/office/powerpoint/2010/main" val="563448677"/>
+      </p:ext>
+    </p:extLst>
+  </p:cSld>
+  <p:clrMapOvr>
+    <a:masterClrMapping/>
+  </p:clrMapOvr>
+</p:sld>
+</file>
+
 <file path=ppt/slides/slide9.xml><?xml version="1.0" encoding="utf-8"?>
 <p:sld xmlns:a="http://schemas.openxmlformats.org/drawingml/2006/main" xmlns:r="http://schemas.openxmlformats.org/officeDocument/2006/relationships" xmlns:p="http://schemas.openxmlformats.org/presentationml/2006/main">
   <p:cSld>

</xml_diff>